<commit_message>
Minor fixes on condiitonal statements basics slides
</commit_message>
<xml_diff>
--- a/Courses/Software-Sciences/Module-1-OOP/03.1-Conditional-Statements-Basics/03.1-Conditional-Statements-Basics.pptx
+++ b/Courses/Software-Sciences/Module-1-OOP/03.1-Conditional-Statements-Basics/03.1-Conditional-Statements-Basics.pptx
@@ -331,7 +331,7 @@
           <a:p>
             <a:fld id="{4E087215-0C8F-4762-A664-737A353EC9A4}" type="datetimeFigureOut">
               <a:rPr lang="bg-BG" smtClean="0"/>
-              <a:t>4.05.23 г.</a:t>
+              <a:t>16.05.23 г.</a:t>
             </a:fld>
             <a:endParaRPr lang="bg-BG" dirty="0"/>
           </a:p>
@@ -522,7 +522,7 @@
           <a:p>
             <a:fld id="{72D84649-876A-46C9-8472-14CB09C070D8}" type="datetimeFigureOut">
               <a:rPr lang="en-US" smtClean="0"/>
-              <a:t>5/4/23</a:t>
+              <a:t>5/16/23</a:t>
             </a:fld>
             <a:endParaRPr lang="en-US" dirty="0"/>
           </a:p>

</xml_diff>

<commit_message>
Minor fixes on conditional statements basics slides
</commit_message>
<xml_diff>
--- a/Courses/Software-Sciences/Module-1-OOP/03.1-Conditional-Statements-Basics/03.1-Conditional-Statements-Basics.pptx
+++ b/Courses/Software-Sciences/Module-1-OOP/03.1-Conditional-Statements-Basics/03.1-Conditional-Statements-Basics.pptx
@@ -331,7 +331,7 @@
           <a:p>
             <a:fld id="{4E087215-0C8F-4762-A664-737A353EC9A4}" type="datetimeFigureOut">
               <a:rPr lang="bg-BG" smtClean="0"/>
-              <a:t>16.05.23 г.</a:t>
+              <a:t>17.05.23 г.</a:t>
             </a:fld>
             <a:endParaRPr lang="bg-BG" dirty="0"/>
           </a:p>
@@ -522,7 +522,7 @@
           <a:p>
             <a:fld id="{72D84649-876A-46C9-8472-14CB09C070D8}" type="datetimeFigureOut">
               <a:rPr lang="en-US" smtClean="0"/>
-              <a:t>5/16/23</a:t>
+              <a:t>5/17/23</a:t>
             </a:fld>
             <a:endParaRPr lang="en-US" dirty="0"/>
           </a:p>
@@ -18739,7 +18739,7 @@
           <a:p>
             <a:r>
               <a:rPr lang="bg-BG" dirty="0"/>
-              <a:t>Четно или нечетно – решение</a:t>
+              <a:t>Решение: Четно или нечетно</a:t>
             </a:r>
           </a:p>
         </p:txBody>

</xml_diff>

<commit_message>
Fixed animations for conditional statements basics
</commit_message>
<xml_diff>
--- a/Courses/Software-Sciences/Module-1-OOP/03.1-Conditional-Statements-Basics/03.1-Conditional-Statements-Basics.pptx
+++ b/Courses/Software-Sciences/Module-1-OOP/03.1-Conditional-Statements-Basics/03.1-Conditional-Statements-Basics.pptx
@@ -331,7 +331,7 @@
           <a:p>
             <a:fld id="{4E087215-0C8F-4762-A664-737A353EC9A4}" type="datetimeFigureOut">
               <a:rPr lang="bg-BG" smtClean="0"/>
-              <a:t>17.05.23 г.</a:t>
+              <a:t>15.06.23 г.</a:t>
             </a:fld>
             <a:endParaRPr lang="bg-BG" dirty="0"/>
           </a:p>
@@ -522,7 +522,7 @@
           <a:p>
             <a:fld id="{72D84649-876A-46C9-8472-14CB09C070D8}" type="datetimeFigureOut">
               <a:rPr lang="en-US" smtClean="0"/>
-              <a:t>5/17/23</a:t>
+              <a:t>6/15/23</a:t>
             </a:fld>
             <a:endParaRPr lang="en-US" dirty="0"/>
           </a:p>
@@ -41548,7 +41548,7 @@
           <a:p>
             <a:r>
               <a:rPr lang="bg-BG" dirty="0"/>
-              <a:t>Булева променлива – пример</a:t>
+              <a:t>Пример: булева променлива</a:t>
             </a:r>
             <a:endParaRPr lang="en-US" dirty="0"/>
           </a:p>
@@ -41792,14 +41792,11 @@
               <a:rPr lang="en-US" sz="2799" dirty="0"/>
               <a:t>Console.WriteLine(isPositive); </a:t>
             </a:r>
-            <a:r>
-              <a:rPr lang="en-US" sz="2799" i="1" dirty="0">
-                <a:solidFill>
-                  <a:schemeClr val="accent2"/>
-                </a:solidFill>
-              </a:rPr>
-              <a:t>// true</a:t>
-            </a:r>
+            <a:endParaRPr lang="en-US" sz="2799" i="1" dirty="0">
+              <a:solidFill>
+                <a:schemeClr val="accent2"/>
+              </a:solidFill>
+            </a:endParaRPr>
           </a:p>
         </p:txBody>
       </p:sp>
@@ -42041,14 +42038,11 @@
               <a:rPr lang="en-US" sz="2799" dirty="0"/>
               <a:t>Console.WriteLine(isPositive); </a:t>
             </a:r>
-            <a:r>
-              <a:rPr lang="en-US" sz="2799" i="1" dirty="0">
-                <a:solidFill>
-                  <a:schemeClr val="accent2"/>
-                </a:solidFill>
-              </a:rPr>
-              <a:t>// false</a:t>
-            </a:r>
+            <a:endParaRPr lang="en-US" sz="2799" i="1" dirty="0">
+              <a:solidFill>
+                <a:schemeClr val="accent2"/>
+              </a:solidFill>
+            </a:endParaRPr>
           </a:p>
         </p:txBody>
       </p:sp>
@@ -42179,6 +42173,126 @@
               <a:t>8</a:t>
             </a:fld>
             <a:endParaRPr lang="en-US" dirty="0"/>
+          </a:p>
+        </p:txBody>
+      </p:sp>
+      <p:sp>
+        <p:nvSpPr>
+          <p:cNvPr id="2" name="TextBox 1">
+            <a:extLst>
+              <a:ext uri="{FF2B5EF4-FFF2-40B4-BE49-F238E27FC236}">
+                <a16:creationId xmlns:a16="http://schemas.microsoft.com/office/drawing/2014/main" id="{B2185F7F-6F67-2035-20F2-621E083804A7}"/>
+              </a:ext>
+            </a:extLst>
+          </p:cNvPr>
+          <p:cNvSpPr txBox="1"/>
+          <p:nvPr/>
+        </p:nvSpPr>
+        <p:spPr>
+          <a:xfrm>
+            <a:off x="8121000" y="2763076"/>
+            <a:ext cx="1670999" cy="665924"/>
+          </a:xfrm>
+          <a:prstGeom prst="rect">
+            <a:avLst/>
+          </a:prstGeom>
+          <a:noFill/>
+          <a:ln w="12700">
+            <a:noFill/>
+          </a:ln>
+        </p:spPr>
+        <p:txBody>
+          <a:bodyPr vert="horz" wrap="none" lIns="144000" tIns="108000" rIns="144000" bIns="108000" rtlCol="0">
+            <a:spAutoFit/>
+          </a:bodyPr>
+          <a:lstStyle/>
+          <a:p>
+            <a:pPr algn="l" eaLnBrk="0" hangingPunct="0">
+              <a:lnSpc>
+                <a:spcPct val="110000"/>
+              </a:lnSpc>
+              <a:buClr>
+                <a:schemeClr val="accent5">
+                  <a:lumMod val="40000"/>
+                  <a:lumOff val="60000"/>
+                </a:schemeClr>
+              </a:buClr>
+              <a:buSzPct val="70000"/>
+            </a:pPr>
+            <a:r>
+              <a:rPr lang="en-US" sz="2800" b="1" dirty="0">
+                <a:solidFill>
+                  <a:schemeClr val="accent2"/>
+                </a:solidFill>
+                <a:latin typeface="Consolas" panose="020B0609020204030204" pitchFamily="49" charset="0"/>
+                <a:cs typeface="Consolas" panose="020B0609020204030204" pitchFamily="49" charset="0"/>
+              </a:rPr>
+              <a:t>// true</a:t>
+            </a:r>
+            <a:endParaRPr lang="en-BG" sz="2800" b="1" dirty="0">
+              <a:latin typeface="Consolas" panose="020B0609020204030204" pitchFamily="49" charset="0"/>
+              <a:cs typeface="Consolas" panose="020B0609020204030204" pitchFamily="49" charset="0"/>
+            </a:endParaRPr>
+          </a:p>
+        </p:txBody>
+      </p:sp>
+      <p:sp>
+        <p:nvSpPr>
+          <p:cNvPr id="3" name="TextBox 2">
+            <a:extLst>
+              <a:ext uri="{FF2B5EF4-FFF2-40B4-BE49-F238E27FC236}">
+                <a16:creationId xmlns:a16="http://schemas.microsoft.com/office/drawing/2014/main" id="{BAAA2D5D-691C-C774-D237-BF5791B32298}"/>
+              </a:ext>
+            </a:extLst>
+          </p:cNvPr>
+          <p:cNvSpPr txBox="1"/>
+          <p:nvPr/>
+        </p:nvSpPr>
+        <p:spPr>
+          <a:xfrm>
+            <a:off x="8120999" y="4992125"/>
+            <a:ext cx="1868167" cy="665924"/>
+          </a:xfrm>
+          <a:prstGeom prst="rect">
+            <a:avLst/>
+          </a:prstGeom>
+          <a:noFill/>
+          <a:ln w="12700">
+            <a:noFill/>
+          </a:ln>
+        </p:spPr>
+        <p:txBody>
+          <a:bodyPr vert="horz" wrap="none" lIns="144000" tIns="108000" rIns="144000" bIns="108000" rtlCol="0">
+            <a:spAutoFit/>
+          </a:bodyPr>
+          <a:lstStyle/>
+          <a:p>
+            <a:pPr algn="l" eaLnBrk="0" hangingPunct="0">
+              <a:lnSpc>
+                <a:spcPct val="110000"/>
+              </a:lnSpc>
+              <a:buClr>
+                <a:schemeClr val="accent5">
+                  <a:lumMod val="40000"/>
+                  <a:lumOff val="60000"/>
+                </a:schemeClr>
+              </a:buClr>
+              <a:buSzPct val="70000"/>
+            </a:pPr>
+            <a:r>
+              <a:rPr lang="en-US" sz="2800" b="1" dirty="0">
+                <a:solidFill>
+                  <a:schemeClr val="accent2"/>
+                </a:solidFill>
+                <a:latin typeface="Consolas" panose="020B0609020204030204" pitchFamily="49" charset="0"/>
+                <a:cs typeface="Consolas" panose="020B0609020204030204" pitchFamily="49" charset="0"/>
+              </a:rPr>
+              <a:t>// false</a:t>
+            </a:r>
+            <a:endParaRPr lang="en-BG" sz="2800" b="1" dirty="0">
+              <a:latin typeface="Consolas" panose="020B0609020204030204" pitchFamily="49" charset="0"/>
+              <a:cs typeface="Consolas" panose="020B0609020204030204" pitchFamily="49" charset="0"/>
+            </a:endParaRPr>
           </a:p>
         </p:txBody>
       </p:sp>
@@ -42221,7 +42335,7 @@
                             </p:stCondLst>
                             <p:childTnLst>
                               <p:par>
-                                <p:cTn id="5" presetID="1" presetClass="entr" presetSubtype="0" fill="hold" nodeType="clickEffect">
+                                <p:cTn id="5" presetID="1" presetClass="entr" presetSubtype="0" fill="hold" grpId="0" nodeType="clickEffect">
                                   <p:stCondLst>
                                     <p:cond delay="0"/>
                                   </p:stCondLst>
@@ -42234,11 +42348,7 @@
                                           </p:stCondLst>
                                         </p:cTn>
                                         <p:tgtEl>
-                                          <p:spTgt spid="7">
-                                            <p:txEl>
-                                              <p:pRg st="2" end="2"/>
-                                            </p:txEl>
-                                          </p:spTgt>
+                                          <p:spTgt spid="2"/>
                                         </p:tgtEl>
                                         <p:attrNameLst>
                                           <p:attrName>style.visibility</p:attrName>
@@ -42358,33 +42468,15 @@
                                   </p:childTnLst>
                                 </p:cTn>
                               </p:par>
-                            </p:childTnLst>
-                          </p:cTn>
-                        </p:par>
-                      </p:childTnLst>
-                    </p:cTn>
-                  </p:par>
-                  <p:par>
-                    <p:cTn id="15" fill="hold">
-                      <p:stCondLst>
-                        <p:cond delay="indefinite"/>
-                      </p:stCondLst>
-                      <p:childTnLst>
-                        <p:par>
-                          <p:cTn id="16" fill="hold">
-                            <p:stCondLst>
-                              <p:cond delay="0"/>
-                            </p:stCondLst>
-                            <p:childTnLst>
                               <p:par>
-                                <p:cTn id="17" presetID="1" presetClass="entr" presetSubtype="0" fill="hold" nodeType="clickEffect">
+                                <p:cTn id="15" presetID="1" presetClass="entr" presetSubtype="0" fill="hold" nodeType="withEffect">
                                   <p:stCondLst>
                                     <p:cond delay="0"/>
                                   </p:stCondLst>
                                   <p:childTnLst>
                                     <p:set>
                                       <p:cBhvr>
-                                        <p:cTn id="18" dur="1" fill="hold">
+                                        <p:cTn id="16" dur="1" fill="hold">
                                           <p:stCondLst>
                                             <p:cond delay="0"/>
                                           </p:stCondLst>
@@ -42395,6 +42487,51 @@
                                               <p:pRg st="2" end="2"/>
                                             </p:txEl>
                                           </p:spTgt>
+                                        </p:tgtEl>
+                                        <p:attrNameLst>
+                                          <p:attrName>style.visibility</p:attrName>
+                                        </p:attrNameLst>
+                                      </p:cBhvr>
+                                      <p:to>
+                                        <p:strVal val="visible"/>
+                                      </p:to>
+                                    </p:set>
+                                  </p:childTnLst>
+                                </p:cTn>
+                              </p:par>
+                            </p:childTnLst>
+                          </p:cTn>
+                        </p:par>
+                      </p:childTnLst>
+                    </p:cTn>
+                  </p:par>
+                  <p:par>
+                    <p:cTn id="17" fill="hold">
+                      <p:stCondLst>
+                        <p:cond delay="indefinite"/>
+                      </p:stCondLst>
+                      <p:childTnLst>
+                        <p:par>
+                          <p:cTn id="18" fill="hold">
+                            <p:stCondLst>
+                              <p:cond delay="0"/>
+                            </p:stCondLst>
+                            <p:childTnLst>
+                              <p:par>
+                                <p:cTn id="19" presetID="1" presetClass="entr" presetSubtype="0" fill="hold" grpId="0" nodeType="clickEffect">
+                                  <p:stCondLst>
+                                    <p:cond delay="0"/>
+                                  </p:stCondLst>
+                                  <p:childTnLst>
+                                    <p:set>
+                                      <p:cBhvr>
+                                        <p:cTn id="20" dur="1" fill="hold">
+                                          <p:stCondLst>
+                                            <p:cond delay="0"/>
+                                          </p:stCondLst>
+                                        </p:cTn>
+                                        <p:tgtEl>
+                                          <p:spTgt spid="3"/>
                                         </p:tgtEl>
                                         <p:attrNameLst>
                                           <p:attrName>style.visibility</p:attrName>
@@ -42436,6 +42573,8 @@
     </p:tnLst>
     <p:bldLst>
       <p:bldP spid="9" grpId="0" animBg="1"/>
+      <p:bldP spid="2" grpId="0"/>
+      <p:bldP spid="3" grpId="0"/>
     </p:bldLst>
   </p:timing>
 </p:sld>
@@ -42496,6 +42635,46 @@
       </p:pic>
       <p:sp>
         <p:nvSpPr>
+          <p:cNvPr id="3" name="Subtitle 2">
+            <a:extLst>
+              <a:ext uri="{FF2B5EF4-FFF2-40B4-BE49-F238E27FC236}">
+                <a16:creationId xmlns:a16="http://schemas.microsoft.com/office/drawing/2014/main" id="{D83BF5E4-C07B-5503-391B-4493B84BC9C7}"/>
+              </a:ext>
+            </a:extLst>
+          </p:cNvPr>
+          <p:cNvSpPr>
+            <a:spLocks noGrp="1"/>
+          </p:cNvSpPr>
+          <p:nvPr>
+            <p:ph type="subTitle" sz="quarter" idx="11"/>
+          </p:nvPr>
+        </p:nvSpPr>
+        <p:spPr/>
+        <p:txBody>
+          <a:bodyPr/>
+          <a:lstStyle/>
+          <a:p>
+            <a:r>
+              <a:rPr lang="en-BG" dirty="0">
+                <a:latin typeface="Consolas" panose="020B0609020204030204" pitchFamily="49" charset="0"/>
+                <a:cs typeface="Consolas" panose="020B0609020204030204" pitchFamily="49" charset="0"/>
+              </a:rPr>
+              <a:t>If-else</a:t>
+            </a:r>
+            <a:r>
+              <a:rPr lang="en-BG" dirty="0"/>
+              <a:t> </a:t>
+            </a:r>
+            <a:r>
+              <a:rPr lang="bg-BG" dirty="0"/>
+              <a:t>конструкция</a:t>
+            </a:r>
+            <a:endParaRPr lang="en-BG" dirty="0"/>
+          </a:p>
+        </p:txBody>
+      </p:sp>
+      <p:sp>
+        <p:nvSpPr>
           <p:cNvPr id="4" name="Title 3">
             <a:extLst>
               <a:ext uri="{FF2B5EF4-FFF2-40B4-BE49-F238E27FC236}">
@@ -42510,7 +42689,12 @@
             <p:ph type="title" sz="quarter" idx="10"/>
           </p:nvPr>
         </p:nvSpPr>
-        <p:spPr/>
+        <p:spPr>
+          <a:xfrm>
+            <a:off x="615109" y="4704825"/>
+            <a:ext cx="10961783" cy="768084"/>
+          </a:xfrm>
+        </p:spPr>
         <p:txBody>
           <a:bodyPr/>
           <a:lstStyle/>

</xml_diff>